<commit_message>
Set structure guide; some change
</commit_message>
<xml_diff>
--- a/presentations/Миграция на SDN Sprut. Short.pptx
+++ b/presentations/Миграция на SDN Sprut. Short.pptx
@@ -239,7 +239,7 @@
           <a:p>
             <a:fld id="{482C727B-68B7-6148-93A0-F6B6EA8E8875}" type="datetimeFigureOut">
               <a:rPr lang="ru-RU" smtClean="0"/>
-              <a:t>23.07.2024</a:t>
+              <a:t>21.08.2024</a:t>
             </a:fld>
             <a:endParaRPr lang="ru-RU"/>
           </a:p>
@@ -48770,7 +48770,7 @@
                 <a:cs typeface="Play"/>
                 <a:sym typeface="Play"/>
               </a:rPr>
-              <a:t>2026</a:t>
+              <a:t>2025</a:t>
             </a:r>
             <a:endParaRPr sz="3600" u="none" strike="noStrike" cap="none" dirty="0">
               <a:solidFill>
@@ -49762,7 +49762,7 @@
                 <a:latin typeface="VK Sans Display" pitchFamily="2" charset="0"/>
                 <a:extLst>
                   <a:ext uri="http://customooxmlschemas.google.com/">
-                    <go:slidesCustomData xmlns:lc="http://schemas.openxmlformats.org/drawingml/2006/lockedCanvas" xmlns:go="http://customooxmlschemas.google.com/" xmlns:ahyp="http://schemas.microsoft.com/office/drawing/2018/hyperlinkcolor" xmlns:p15="http://schemas.microsoft.com/office/powerpoint/2012/main" xmlns:p14="http://schemas.microsoft.com/office/powerpoint/2010/main" xmlns:com="http://schemas.openxmlformats.org/drawingml/2006/compatibility" xmlns:pvml="urn:schemas-microsoft-com:office:powerpoint" xmlns:v="urn:schemas-microsoft-com:vml" xmlns:o="urn:schemas-microsoft-com:office:office" xmlns:dgm="http://schemas.openxmlformats.org/drawingml/2006/diagram" xmlns:c="http://schemas.openxmlformats.org/drawingml/2006/chart" xmlns:mv="urn:schemas-microsoft-com:mac:vml" xmlns:mc="http://schemas.openxmlformats.org/markup-compatibility/2006" xmlns="" textRoundtripDataId="1"/>
+                    <go:slidesCustomData xmlns="" xmlns:mc="http://schemas.openxmlformats.org/markup-compatibility/2006" xmlns:mv="urn:schemas-microsoft-com:mac:vml" xmlns:c="http://schemas.openxmlformats.org/drawingml/2006/chart" xmlns:dgm="http://schemas.openxmlformats.org/drawingml/2006/diagram" xmlns:o="urn:schemas-microsoft-com:office:office" xmlns:v="urn:schemas-microsoft-com:vml" xmlns:pvml="urn:schemas-microsoft-com:office:powerpoint" xmlns:com="http://schemas.openxmlformats.org/drawingml/2006/compatibility" xmlns:p14="http://schemas.microsoft.com/office/powerpoint/2010/main" xmlns:p15="http://schemas.microsoft.com/office/powerpoint/2012/main" xmlns:ahyp="http://schemas.microsoft.com/office/drawing/2018/hyperlinkcolor" xmlns:go="http://customooxmlschemas.google.com/" xmlns:lc="http://schemas.openxmlformats.org/drawingml/2006/lockedCanvas" textRoundtripDataId="1"/>
                   </a:ext>
                 </a:extLst>
               </a:rPr>
@@ -53095,7 +53095,7 @@
           </a:ln>
           <a:extLst>
             <a:ext uri="{C572A759-6A51-4108-AA02-DFA0A04FC94B}">
-              <ma14:wrappingTextBoxFlag xmlns="" xmlns:m="http://schemas.openxmlformats.org/officeDocument/2006/math" xmlns:a14="http://schemas.microsoft.com/office/drawing/2010/main" xmlns:ma14="http://schemas.microsoft.com/office/mac/drawingml/2011/main" val="1"/>
+              <ma14:wrappingTextBoxFlag xmlns:ma14="http://schemas.microsoft.com/office/mac/drawingml/2011/main" xmlns:a14="http://schemas.microsoft.com/office/drawing/2010/main" xmlns:m="http://schemas.openxmlformats.org/officeDocument/2006/math" xmlns="" val="1"/>
             </a:ext>
           </a:extLst>
         </p:spPr>
@@ -53277,7 +53277,7 @@
           </a:ln>
           <a:extLst>
             <a:ext uri="{C572A759-6A51-4108-AA02-DFA0A04FC94B}">
-              <ma14:wrappingTextBoxFlag xmlns="" xmlns:m="http://schemas.openxmlformats.org/officeDocument/2006/math" xmlns:a14="http://schemas.microsoft.com/office/drawing/2010/main" xmlns:ma14="http://schemas.microsoft.com/office/mac/drawingml/2011/main" val="1"/>
+              <ma14:wrappingTextBoxFlag xmlns:ma14="http://schemas.microsoft.com/office/mac/drawingml/2011/main" xmlns:a14="http://schemas.microsoft.com/office/drawing/2010/main" xmlns:m="http://schemas.openxmlformats.org/officeDocument/2006/math" xmlns="" val="1"/>
             </a:ext>
           </a:extLst>
         </p:spPr>

</xml_diff>

<commit_message>
change presentation; set correct due date deprecate neutron
</commit_message>
<xml_diff>
--- a/presentations/Миграция на SDN Sprut. Short.pptx
+++ b/presentations/Миграция на SDN Sprut. Short.pptx
@@ -239,7 +239,7 @@
           <a:p>
             <a:fld id="{482C727B-68B7-6148-93A0-F6B6EA8E8875}" type="datetimeFigureOut">
               <a:rPr lang="ru-RU" smtClean="0"/>
-              <a:t>23.07.2024</a:t>
+              <a:t>21.08.2024</a:t>
             </a:fld>
             <a:endParaRPr lang="ru-RU"/>
           </a:p>
@@ -48770,7 +48770,7 @@
                 <a:cs typeface="Play"/>
                 <a:sym typeface="Play"/>
               </a:rPr>
-              <a:t>2026</a:t>
+              <a:t>2025</a:t>
             </a:r>
             <a:endParaRPr sz="3600" u="none" strike="noStrike" cap="none" dirty="0">
               <a:solidFill>
@@ -49762,7 +49762,7 @@
                 <a:latin typeface="VK Sans Display" pitchFamily="2" charset="0"/>
                 <a:extLst>
                   <a:ext uri="http://customooxmlschemas.google.com/">
-                    <go:slidesCustomData xmlns:lc="http://schemas.openxmlformats.org/drawingml/2006/lockedCanvas" xmlns:go="http://customooxmlschemas.google.com/" xmlns:ahyp="http://schemas.microsoft.com/office/drawing/2018/hyperlinkcolor" xmlns:p15="http://schemas.microsoft.com/office/powerpoint/2012/main" xmlns:p14="http://schemas.microsoft.com/office/powerpoint/2010/main" xmlns:com="http://schemas.openxmlformats.org/drawingml/2006/compatibility" xmlns:pvml="urn:schemas-microsoft-com:office:powerpoint" xmlns:v="urn:schemas-microsoft-com:vml" xmlns:o="urn:schemas-microsoft-com:office:office" xmlns:dgm="http://schemas.openxmlformats.org/drawingml/2006/diagram" xmlns:c="http://schemas.openxmlformats.org/drawingml/2006/chart" xmlns:mv="urn:schemas-microsoft-com:mac:vml" xmlns:mc="http://schemas.openxmlformats.org/markup-compatibility/2006" xmlns="" textRoundtripDataId="1"/>
+                    <go:slidesCustomData xmlns="" xmlns:mc="http://schemas.openxmlformats.org/markup-compatibility/2006" xmlns:mv="urn:schemas-microsoft-com:mac:vml" xmlns:c="http://schemas.openxmlformats.org/drawingml/2006/chart" xmlns:dgm="http://schemas.openxmlformats.org/drawingml/2006/diagram" xmlns:o="urn:schemas-microsoft-com:office:office" xmlns:v="urn:schemas-microsoft-com:vml" xmlns:pvml="urn:schemas-microsoft-com:office:powerpoint" xmlns:com="http://schemas.openxmlformats.org/drawingml/2006/compatibility" xmlns:p14="http://schemas.microsoft.com/office/powerpoint/2010/main" xmlns:p15="http://schemas.microsoft.com/office/powerpoint/2012/main" xmlns:ahyp="http://schemas.microsoft.com/office/drawing/2018/hyperlinkcolor" xmlns:go="http://customooxmlschemas.google.com/" xmlns:lc="http://schemas.openxmlformats.org/drawingml/2006/lockedCanvas" textRoundtripDataId="1"/>
                   </a:ext>
                 </a:extLst>
               </a:rPr>
@@ -53095,7 +53095,7 @@
           </a:ln>
           <a:extLst>
             <a:ext uri="{C572A759-6A51-4108-AA02-DFA0A04FC94B}">
-              <ma14:wrappingTextBoxFlag xmlns="" xmlns:m="http://schemas.openxmlformats.org/officeDocument/2006/math" xmlns:a14="http://schemas.microsoft.com/office/drawing/2010/main" xmlns:ma14="http://schemas.microsoft.com/office/mac/drawingml/2011/main" val="1"/>
+              <ma14:wrappingTextBoxFlag xmlns:ma14="http://schemas.microsoft.com/office/mac/drawingml/2011/main" xmlns:a14="http://schemas.microsoft.com/office/drawing/2010/main" xmlns:m="http://schemas.openxmlformats.org/officeDocument/2006/math" xmlns="" val="1"/>
             </a:ext>
           </a:extLst>
         </p:spPr>
@@ -53277,7 +53277,7 @@
           </a:ln>
           <a:extLst>
             <a:ext uri="{C572A759-6A51-4108-AA02-DFA0A04FC94B}">
-              <ma14:wrappingTextBoxFlag xmlns="" xmlns:m="http://schemas.openxmlformats.org/officeDocument/2006/math" xmlns:a14="http://schemas.microsoft.com/office/drawing/2010/main" xmlns:ma14="http://schemas.microsoft.com/office/mac/drawingml/2011/main" val="1"/>
+              <ma14:wrappingTextBoxFlag xmlns:ma14="http://schemas.microsoft.com/office/mac/drawingml/2011/main" xmlns:a14="http://schemas.microsoft.com/office/drawing/2010/main" xmlns:m="http://schemas.openxmlformats.org/officeDocument/2006/math" xmlns="" val="1"/>
             </a:ext>
           </a:extLst>
         </p:spPr>

</xml_diff>